<commit_message>
Added Root Cause analysis- final commit
</commit_message>
<xml_diff>
--- a/Blue Minimalist Presentation.pptx
+++ b/Blue Minimalist Presentation.pptx
@@ -11,21 +11,22 @@
     <p:sldId id="259" r:id="rId9"/>
     <p:sldId id="260" r:id="rId10"/>
     <p:sldId id="261" r:id="rId11"/>
+    <p:sldId id="262" r:id="rId12"/>
   </p:sldIdLst>
   <p:sldSz cx="18288000" cy="10287000"/>
   <p:notesSz cx="6858000" cy="9144000"/>
   <p:embeddedFontLst>
     <p:embeddedFont>
       <p:font typeface="Avenir Bold" charset="1" panose="020B0703020203020204"/>
-      <p:regular r:id="rId12"/>
+      <p:regular r:id="rId13"/>
     </p:embeddedFont>
     <p:embeddedFont>
       <p:font typeface="Avenir" charset="1" panose="020B0503020203020204"/>
-      <p:regular r:id="rId13"/>
+      <p:regular r:id="rId14"/>
     </p:embeddedFont>
     <p:embeddedFont>
       <p:font typeface="Canva Sans" charset="1" panose="020B0503030501040103"/>
-      <p:regular r:id="rId14"/>
+      <p:regular r:id="rId15"/>
     </p:embeddedFont>
   </p:embeddedFontLst>
   <p:defaultTextStyle>
@@ -5362,6 +5363,414 @@
 </p:sld>
 </file>
 
+<file path=ppt/slides/slide7.xml><?xml version="1.0" encoding="utf-8"?>
+<p:sld xmlns:p="http://schemas.openxmlformats.org/presentationml/2006/main" xmlns:a="http://schemas.openxmlformats.org/drawingml/2006/main" xmlns:r="http://schemas.openxmlformats.org/officeDocument/2006/relationships">
+  <p:cSld>
+    <p:spTree>
+      <p:nvGrpSpPr>
+        <p:cNvPr id="1" name=""/>
+        <p:cNvGrpSpPr/>
+        <p:nvPr/>
+      </p:nvGrpSpPr>
+      <p:grpSpPr>
+        <a:xfrm>
+          <a:off x="0" y="0"/>
+          <a:ext cx="0" cy="0"/>
+          <a:chOff x="0" y="0"/>
+          <a:chExt cx="0" cy="0"/>
+        </a:xfrm>
+      </p:grpSpPr>
+      <p:sp>
+        <p:nvSpPr>
+          <p:cNvPr name="Freeform 2" id="2"/>
+          <p:cNvSpPr/>
+          <p:nvPr/>
+        </p:nvSpPr>
+        <p:spPr>
+          <a:xfrm flipH="false" flipV="false" rot="0">
+            <a:off x="2417556" y="9164276"/>
+            <a:ext cx="4102978" cy="2245448"/>
+          </a:xfrm>
+          <a:custGeom>
+            <a:avLst/>
+            <a:gdLst/>
+            <a:ahLst/>
+            <a:cxnLst/>
+            <a:rect r="r" b="b" t="t" l="l"/>
+            <a:pathLst>
+              <a:path h="2245448" w="4102978">
+                <a:moveTo>
+                  <a:pt x="0" y="0"/>
+                </a:moveTo>
+                <a:lnTo>
+                  <a:pt x="4102979" y="0"/>
+                </a:lnTo>
+                <a:lnTo>
+                  <a:pt x="4102979" y="2245448"/>
+                </a:lnTo>
+                <a:lnTo>
+                  <a:pt x="0" y="2245448"/>
+                </a:lnTo>
+                <a:lnTo>
+                  <a:pt x="0" y="0"/>
+                </a:lnTo>
+                <a:close/>
+              </a:path>
+            </a:pathLst>
+          </a:custGeom>
+          <a:blipFill>
+            <a:blip r:embed="rId2">
+              <a:extLst>
+                <a:ext uri="{96DAC541-7B7A-43D3-8B79-37D633B846F1}">
+                  <asvg:svgBlip xmlns:asvg="http://schemas.microsoft.com/office/drawing/2016/SVG/main" r:embed="rId3"/>
+                </a:ext>
+              </a:extLst>
+            </a:blip>
+            <a:stretch>
+              <a:fillRect l="0" t="0" r="0" b="0"/>
+            </a:stretch>
+          </a:blipFill>
+        </p:spPr>
+      </p:sp>
+      <p:sp>
+        <p:nvSpPr>
+          <p:cNvPr name="Freeform 3" id="3"/>
+          <p:cNvSpPr/>
+          <p:nvPr/>
+        </p:nvSpPr>
+        <p:spPr>
+          <a:xfrm flipH="false" flipV="false" rot="0">
+            <a:off x="8731108" y="264046"/>
+            <a:ext cx="9014171" cy="5780337"/>
+          </a:xfrm>
+          <a:custGeom>
+            <a:avLst/>
+            <a:gdLst/>
+            <a:ahLst/>
+            <a:cxnLst/>
+            <a:rect r="r" b="b" t="t" l="l"/>
+            <a:pathLst>
+              <a:path h="5780337" w="9014171">
+                <a:moveTo>
+                  <a:pt x="0" y="0"/>
+                </a:moveTo>
+                <a:lnTo>
+                  <a:pt x="9014171" y="0"/>
+                </a:lnTo>
+                <a:lnTo>
+                  <a:pt x="9014171" y="5780337"/>
+                </a:lnTo>
+                <a:lnTo>
+                  <a:pt x="0" y="5780337"/>
+                </a:lnTo>
+                <a:lnTo>
+                  <a:pt x="0" y="0"/>
+                </a:lnTo>
+                <a:close/>
+              </a:path>
+            </a:pathLst>
+          </a:custGeom>
+          <a:blipFill>
+            <a:blip r:embed="rId4"/>
+            <a:stretch>
+              <a:fillRect l="0" t="0" r="0" b="0"/>
+            </a:stretch>
+          </a:blipFill>
+        </p:spPr>
+      </p:sp>
+      <p:sp>
+        <p:nvSpPr>
+          <p:cNvPr name="Freeform 4" id="4"/>
+          <p:cNvSpPr/>
+          <p:nvPr/>
+        </p:nvSpPr>
+        <p:spPr>
+          <a:xfrm flipH="false" flipV="false" rot="0">
+            <a:off x="712231" y="3931228"/>
+            <a:ext cx="7513629" cy="6177873"/>
+          </a:xfrm>
+          <a:custGeom>
+            <a:avLst/>
+            <a:gdLst/>
+            <a:ahLst/>
+            <a:cxnLst/>
+            <a:rect r="r" b="b" t="t" l="l"/>
+            <a:pathLst>
+              <a:path h="6177873" w="7513629">
+                <a:moveTo>
+                  <a:pt x="0" y="0"/>
+                </a:moveTo>
+                <a:lnTo>
+                  <a:pt x="7513629" y="0"/>
+                </a:lnTo>
+                <a:lnTo>
+                  <a:pt x="7513629" y="6177873"/>
+                </a:lnTo>
+                <a:lnTo>
+                  <a:pt x="0" y="6177873"/>
+                </a:lnTo>
+                <a:lnTo>
+                  <a:pt x="0" y="0"/>
+                </a:lnTo>
+                <a:close/>
+              </a:path>
+            </a:pathLst>
+          </a:custGeom>
+          <a:blipFill>
+            <a:blip r:embed="rId5"/>
+            <a:stretch>
+              <a:fillRect l="0" t="0" r="0" b="0"/>
+            </a:stretch>
+          </a:blipFill>
+        </p:spPr>
+      </p:sp>
+      <p:sp>
+        <p:nvSpPr>
+          <p:cNvPr name="TextBox 5" id="5"/>
+          <p:cNvSpPr txBox="true"/>
+          <p:nvPr/>
+        </p:nvSpPr>
+        <p:spPr>
+          <a:xfrm rot="0">
+            <a:off x="13018140" y="5463993"/>
+            <a:ext cx="9525" cy="580390"/>
+          </a:xfrm>
+          <a:prstGeom prst="rect">
+            <a:avLst/>
+          </a:prstGeom>
+        </p:spPr>
+        <p:txBody>
+          <a:bodyPr anchor="t" rtlCol="false" tIns="0" lIns="0" bIns="0" rIns="0">
+            <a:spAutoFit/>
+          </a:bodyPr>
+          <a:lstStyle/>
+          <a:p>
+            <a:pPr algn="ctr">
+              <a:lnSpc>
+                <a:spcPts val="4759"/>
+              </a:lnSpc>
+            </a:pPr>
+          </a:p>
+        </p:txBody>
+      </p:sp>
+      <p:sp>
+        <p:nvSpPr>
+          <p:cNvPr name="TextBox 6" id="6"/>
+          <p:cNvSpPr txBox="true"/>
+          <p:nvPr/>
+        </p:nvSpPr>
+        <p:spPr>
+          <a:xfrm rot="0">
+            <a:off x="712231" y="542914"/>
+            <a:ext cx="7513629" cy="3714750"/>
+          </a:xfrm>
+          <a:prstGeom prst="rect">
+            <a:avLst/>
+          </a:prstGeom>
+        </p:spPr>
+        <p:txBody>
+          <a:bodyPr anchor="t" rtlCol="false" tIns="0" lIns="0" bIns="0" rIns="0">
+            <a:spAutoFit/>
+          </a:bodyPr>
+          <a:lstStyle/>
+          <a:p>
+            <a:pPr algn="just">
+              <a:lnSpc>
+                <a:spcPts val="4200"/>
+              </a:lnSpc>
+            </a:pPr>
+            <a:r>
+              <a:rPr lang="en-US" sz="3000">
+                <a:solidFill>
+                  <a:srgbClr val="000000"/>
+                </a:solidFill>
+                <a:latin typeface="Canva Sans"/>
+                <a:ea typeface="Canva Sans"/>
+                <a:cs typeface="Canva Sans"/>
+                <a:sym typeface="Canva Sans"/>
+              </a:rPr>
+              <a:t>Plotted  UMAP post Pca for faster results:</a:t>
+            </a:r>
+          </a:p>
+          <a:p>
+            <a:pPr algn="just" marL="647702" indent="-323851" lvl="1">
+              <a:lnSpc>
+                <a:spcPts val="4200"/>
+              </a:lnSpc>
+              <a:buAutoNum type="arabicPeriod" startAt="1"/>
+            </a:pPr>
+            <a:r>
+              <a:rPr lang="en-US" sz="3000">
+                <a:solidFill>
+                  <a:srgbClr val="000000"/>
+                </a:solidFill>
+                <a:latin typeface="Canva Sans"/>
+                <a:ea typeface="Canva Sans"/>
+                <a:cs typeface="Canva Sans"/>
+                <a:sym typeface="Canva Sans"/>
+              </a:rPr>
+              <a:t>Outliers are mostly on the edges</a:t>
+            </a:r>
+          </a:p>
+          <a:p>
+            <a:pPr algn="just" marL="647702" indent="-323851" lvl="1">
+              <a:lnSpc>
+                <a:spcPts val="4200"/>
+              </a:lnSpc>
+              <a:buAutoNum type="arabicPeriod" startAt="1"/>
+            </a:pPr>
+            <a:r>
+              <a:rPr lang="en-US" sz="3000">
+                <a:solidFill>
+                  <a:srgbClr val="000000"/>
+                </a:solidFill>
+                <a:latin typeface="Canva Sans"/>
+                <a:ea typeface="Canva Sans"/>
+                <a:cs typeface="Canva Sans"/>
+                <a:sym typeface="Canva Sans"/>
+              </a:rPr>
+              <a:t>main dense cluster rep normal df, dominant pattern</a:t>
+            </a:r>
+          </a:p>
+          <a:p>
+            <a:pPr algn="just" marL="647702" indent="-323851" lvl="1">
+              <a:lnSpc>
+                <a:spcPts val="4200"/>
+              </a:lnSpc>
+              <a:buAutoNum type="arabicPeriod" startAt="1"/>
+            </a:pPr>
+            <a:r>
+              <a:rPr lang="en-US" sz="3000">
+                <a:solidFill>
+                  <a:srgbClr val="000000"/>
+                </a:solidFill>
+                <a:latin typeface="Canva Sans"/>
+                <a:ea typeface="Canva Sans"/>
+                <a:cs typeface="Canva Sans"/>
+                <a:sym typeface="Canva Sans"/>
+              </a:rPr>
+              <a:t>Need for refining the model more </a:t>
+            </a:r>
+          </a:p>
+          <a:p>
+            <a:pPr algn="just" marL="647702" indent="-323851" lvl="1">
+              <a:lnSpc>
+                <a:spcPts val="4200"/>
+              </a:lnSpc>
+              <a:buAutoNum type="arabicPeriod" startAt="1"/>
+            </a:pPr>
+            <a:r>
+              <a:rPr lang="en-US" sz="3000">
+                <a:solidFill>
+                  <a:srgbClr val="000000"/>
+                </a:solidFill>
+                <a:latin typeface="Canva Sans"/>
+                <a:ea typeface="Canva Sans"/>
+                <a:cs typeface="Canva Sans"/>
+                <a:sym typeface="Canva Sans"/>
+              </a:rPr>
+              <a:t>Parameter Tuning</a:t>
+            </a:r>
+          </a:p>
+        </p:txBody>
+      </p:sp>
+      <p:sp>
+        <p:nvSpPr>
+          <p:cNvPr name="TextBox 7" id="7"/>
+          <p:cNvSpPr txBox="true"/>
+          <p:nvPr/>
+        </p:nvSpPr>
+        <p:spPr>
+          <a:xfrm rot="0">
+            <a:off x="8731108" y="6391807"/>
+            <a:ext cx="8528192" cy="3268239"/>
+          </a:xfrm>
+          <a:prstGeom prst="rect">
+            <a:avLst/>
+          </a:prstGeom>
+        </p:spPr>
+        <p:txBody>
+          <a:bodyPr anchor="t" rtlCol="false" tIns="0" lIns="0" bIns="0" rIns="0">
+            <a:spAutoFit/>
+          </a:bodyPr>
+          <a:lstStyle/>
+          <a:p>
+            <a:pPr algn="just" marL="665715" indent="-332858" lvl="1">
+              <a:lnSpc>
+                <a:spcPts val="4316"/>
+              </a:lnSpc>
+              <a:buAutoNum type="arabicPeriod" startAt="1"/>
+            </a:pPr>
+            <a:r>
+              <a:rPr lang="en-US" sz="3083">
+                <a:solidFill>
+                  <a:srgbClr val="000000"/>
+                </a:solidFill>
+                <a:latin typeface="Canva Sans"/>
+                <a:ea typeface="Canva Sans"/>
+                <a:cs typeface="Canva Sans"/>
+                <a:sym typeface="Canva Sans"/>
+              </a:rPr>
+              <a:t>some red points are embedded within blue region similar to above</a:t>
+            </a:r>
+          </a:p>
+          <a:p>
+            <a:pPr algn="just" marL="665715" indent="-332858" lvl="1">
+              <a:lnSpc>
+                <a:spcPts val="4316"/>
+              </a:lnSpc>
+              <a:buAutoNum type="arabicPeriod" startAt="1"/>
+            </a:pPr>
+            <a:r>
+              <a:rPr lang="en-US" sz="3083">
+                <a:solidFill>
+                  <a:srgbClr val="000000"/>
+                </a:solidFill>
+                <a:latin typeface="Canva Sans"/>
+                <a:ea typeface="Canva Sans"/>
+                <a:cs typeface="Canva Sans"/>
+                <a:sym typeface="Canva Sans"/>
+              </a:rPr>
+              <a:t>cd hint towards borderline anomalies, or maybe potential misclassifications.</a:t>
+            </a:r>
+          </a:p>
+          <a:p>
+            <a:pPr algn="just" marL="665715" indent="-332858" lvl="1">
+              <a:lnSpc>
+                <a:spcPts val="4316"/>
+              </a:lnSpc>
+              <a:buAutoNum type="arabicPeriod" startAt="1"/>
+            </a:pPr>
+            <a:r>
+              <a:rPr lang="en-US" sz="3083">
+                <a:solidFill>
+                  <a:srgbClr val="000000"/>
+                </a:solidFill>
+                <a:latin typeface="Canva Sans"/>
+                <a:ea typeface="Canva Sans"/>
+                <a:cs typeface="Canva Sans"/>
+                <a:sym typeface="Canva Sans"/>
+              </a:rPr>
+              <a:t>3D obviously provides better inference</a:t>
+            </a:r>
+          </a:p>
+          <a:p>
+            <a:pPr algn="just">
+              <a:lnSpc>
+                <a:spcPts val="4316"/>
+              </a:lnSpc>
+            </a:pPr>
+          </a:p>
+        </p:txBody>
+      </p:sp>
+    </p:spTree>
+  </p:cSld>
+  <p:clrMapOvr>
+    <a:masterClrMapping/>
+  </p:clrMapOvr>
+</p:sld>
+</file>
+
 <file path=ppt/theme/theme1.xml><?xml version="1.0" encoding="utf-8"?>
 <a:theme xmlns:a="http://schemas.openxmlformats.org/drawingml/2006/main" name="Office Theme">
   <a:themeElements>

</xml_diff>